<commit_message>
Created references and test data
</commit_message>
<xml_diff>
--- a/docs/Vinyl - Datenmodell.pptx
+++ b/docs/Vinyl - Datenmodell.pptx
@@ -13658,14 +13658,14 @@
           <p:nvPr>
             <p:extLst>
               <p:ext uri="{D42A27DB-BD31-4B8C-83A1-F6EECF244321}">
-                <p14:modId xmlns:p14="http://schemas.microsoft.com/office/powerpoint/2010/main" val="2245089776"/>
+                <p14:modId xmlns:p14="http://schemas.microsoft.com/office/powerpoint/2010/main" val="3277205134"/>
               </p:ext>
             </p:extLst>
           </p:nvPr>
         </p:nvGraphicFramePr>
         <p:xfrm>
           <a:off x="180000" y="3660839"/>
-          <a:ext cx="12441600" cy="3337560"/>
+          <a:ext cx="12441601" cy="3337560"/>
         </p:xfrm>
         <a:graphic>
           <a:graphicData uri="http://schemas.openxmlformats.org/drawingml/2006/table">
@@ -13674,21 +13674,28 @@
                 <a:tableStyleId>{5A111915-BE36-4E01-A7E5-04B1672EAD32}</a:tableStyleId>
               </a:tblPr>
               <a:tblGrid>
-                <a:gridCol w="3438411">
+                <a:gridCol w="2693911">
                   <a:extLst>
                     <a:ext uri="{9D8B030D-6E8A-4147-A177-3AD203B41FA5}">
                       <a16:colId xmlns:a16="http://schemas.microsoft.com/office/drawing/2014/main" val="145125657"/>
                     </a:ext>
                   </a:extLst>
                 </a:gridCol>
-                <a:gridCol w="4855989">
+                <a:gridCol w="2693911">
+                  <a:extLst>
+                    <a:ext uri="{9D8B030D-6E8A-4147-A177-3AD203B41FA5}">
+                      <a16:colId xmlns:a16="http://schemas.microsoft.com/office/drawing/2014/main" val="2863958022"/>
+                    </a:ext>
+                  </a:extLst>
+                </a:gridCol>
+                <a:gridCol w="3804549">
                   <a:extLst>
                     <a:ext uri="{9D8B030D-6E8A-4147-A177-3AD203B41FA5}">
                       <a16:colId xmlns:a16="http://schemas.microsoft.com/office/drawing/2014/main" val="1721043116"/>
                     </a:ext>
                   </a:extLst>
                 </a:gridCol>
-                <a:gridCol w="4147200">
+                <a:gridCol w="3249230">
                   <a:extLst>
                     <a:ext uri="{9D8B030D-6E8A-4147-A177-3AD203B41FA5}">
                       <a16:colId xmlns:a16="http://schemas.microsoft.com/office/drawing/2014/main" val="2359141252"/>
@@ -13718,6 +13725,20 @@
                     <a:p>
                       <a:pPr algn="ctr"/>
                       <a:r>
+                        <a:rPr lang="de-DE" sz="1600" b="0" u="none" dirty="0"/>
+                        <a:t>realname</a:t>
+                      </a:r>
+                    </a:p>
+                  </a:txBody>
+                  <a:tcPr/>
+                </a:tc>
+                <a:tc>
+                  <a:txBody>
+                    <a:bodyPr/>
+                    <a:lstStyle/>
+                    <a:p>
+                      <a:pPr algn="ctr"/>
+                      <a:r>
                         <a:rPr lang="de-DE" sz="1600" b="0" dirty="0"/>
                         <a:t>description</a:t>
                       </a:r>
@@ -13767,6 +13788,20 @@
                     <a:p>
                       <a:pPr algn="ctr"/>
                       <a:r>
+                        <a:rPr lang="de-DE" sz="1600" dirty="0"/>
+                        <a:t>-</a:t>
+                      </a:r>
+                    </a:p>
+                  </a:txBody>
+                  <a:tcPr/>
+                </a:tc>
+                <a:tc>
+                  <a:txBody>
+                    <a:bodyPr/>
+                    <a:lstStyle/>
+                    <a:p>
+                      <a:pPr algn="ctr"/>
+                      <a:r>
                         <a:rPr lang="de-DE" sz="1600" dirty="0" err="1"/>
                         <a:t>Lorem</a:t>
                       </a:r>
@@ -13810,18 +13845,7 @@
                         <a:rPr lang="de-DE" sz="1600" dirty="0" err="1"/>
                         <a:t>consetetur</a:t>
                       </a:r>
-                      <a:r>
-                        <a:rPr lang="de-DE" sz="1600" dirty="0"/>
-                        <a:t> </a:t>
-                      </a:r>
-                      <a:r>
-                        <a:rPr lang="de-DE" sz="1600" dirty="0" err="1"/>
-                        <a:t>sadipscing</a:t>
-                      </a:r>
-                      <a:r>
-                        <a:rPr lang="de-DE" sz="1600" dirty="0"/>
-                        <a:t>…</a:t>
-                      </a:r>
+                      <a:endParaRPr lang="de-DE" sz="1600" dirty="0"/>
                     </a:p>
                   </a:txBody>
                   <a:tcPr/>
@@ -13868,6 +13892,20 @@
                     <a:p>
                       <a:pPr algn="ctr"/>
                       <a:r>
+                        <a:rPr lang="de-DE" sz="1600" dirty="0"/>
+                        <a:t>-</a:t>
+                      </a:r>
+                    </a:p>
+                  </a:txBody>
+                  <a:tcPr/>
+                </a:tc>
+                <a:tc>
+                  <a:txBody>
+                    <a:bodyPr/>
+                    <a:lstStyle/>
+                    <a:p>
+                      <a:pPr algn="ctr"/>
+                      <a:r>
                         <a:rPr lang="de-DE" sz="1600" dirty="0" err="1"/>
                         <a:t>Lorem</a:t>
                       </a:r>
@@ -13911,18 +13949,7 @@
                         <a:rPr lang="de-DE" sz="1600" dirty="0" err="1"/>
                         <a:t>consetetur</a:t>
                       </a:r>
-                      <a:r>
-                        <a:rPr lang="de-DE" sz="1600" dirty="0"/>
-                        <a:t> </a:t>
-                      </a:r>
-                      <a:r>
-                        <a:rPr lang="de-DE" sz="1600" dirty="0" err="1"/>
-                        <a:t>sadipscing</a:t>
-                      </a:r>
-                      <a:r>
-                        <a:rPr lang="de-DE" sz="1600" dirty="0"/>
-                        <a:t>…</a:t>
-                      </a:r>
+                      <a:endParaRPr lang="de-DE" sz="1600" dirty="0"/>
                     </a:p>
                   </a:txBody>
                   <a:tcPr/>
@@ -13969,6 +13996,20 @@
                     <a:p>
                       <a:pPr algn="ctr"/>
                       <a:r>
+                        <a:rPr lang="de-DE" sz="1600" dirty="0"/>
+                        <a:t>-</a:t>
+                      </a:r>
+                    </a:p>
+                  </a:txBody>
+                  <a:tcPr/>
+                </a:tc>
+                <a:tc>
+                  <a:txBody>
+                    <a:bodyPr/>
+                    <a:lstStyle/>
+                    <a:p>
+                      <a:pPr algn="ctr"/>
+                      <a:r>
                         <a:rPr lang="de-DE" sz="1600" dirty="0" err="1"/>
                         <a:t>Lorem</a:t>
                       </a:r>
@@ -14012,18 +14053,7 @@
                         <a:rPr lang="de-DE" sz="1600" dirty="0" err="1"/>
                         <a:t>consetetur</a:t>
                       </a:r>
-                      <a:r>
-                        <a:rPr lang="de-DE" sz="1600" dirty="0"/>
-                        <a:t> </a:t>
-                      </a:r>
-                      <a:r>
-                        <a:rPr lang="de-DE" sz="1600" dirty="0" err="1"/>
-                        <a:t>sadipscing</a:t>
-                      </a:r>
-                      <a:r>
-                        <a:rPr lang="de-DE" sz="1600" dirty="0"/>
-                        <a:t>…</a:t>
-                      </a:r>
+                      <a:endParaRPr lang="de-DE" sz="1600" dirty="0"/>
                     </a:p>
                   </a:txBody>
                   <a:tcPr/>
@@ -14070,6 +14100,20 @@
                     <a:p>
                       <a:pPr algn="ctr"/>
                       <a:r>
+                        <a:rPr lang="de-DE" sz="1600" dirty="0"/>
+                        <a:t>-</a:t>
+                      </a:r>
+                    </a:p>
+                  </a:txBody>
+                  <a:tcPr/>
+                </a:tc>
+                <a:tc>
+                  <a:txBody>
+                    <a:bodyPr/>
+                    <a:lstStyle/>
+                    <a:p>
+                      <a:pPr algn="ctr"/>
+                      <a:r>
                         <a:rPr lang="de-DE" sz="1600" dirty="0" err="1"/>
                         <a:t>Lorem</a:t>
                       </a:r>
@@ -14113,18 +14157,7 @@
                         <a:rPr lang="de-DE" sz="1600" dirty="0" err="1"/>
                         <a:t>consetetur</a:t>
                       </a:r>
-                      <a:r>
-                        <a:rPr lang="de-DE" sz="1600" dirty="0"/>
-                        <a:t> </a:t>
-                      </a:r>
-                      <a:r>
-                        <a:rPr lang="de-DE" sz="1600" dirty="0" err="1"/>
-                        <a:t>sadipscing</a:t>
-                      </a:r>
-                      <a:r>
-                        <a:rPr lang="de-DE" sz="1600" dirty="0"/>
-                        <a:t>…</a:t>
-                      </a:r>
+                      <a:endParaRPr lang="de-DE" sz="1600" dirty="0"/>
                     </a:p>
                   </a:txBody>
                   <a:tcPr/>
@@ -14171,6 +14204,20 @@
                     <a:p>
                       <a:pPr algn="ctr"/>
                       <a:r>
+                        <a:rPr lang="de-DE" sz="1600" dirty="0"/>
+                        <a:t>-</a:t>
+                      </a:r>
+                    </a:p>
+                  </a:txBody>
+                  <a:tcPr/>
+                </a:tc>
+                <a:tc>
+                  <a:txBody>
+                    <a:bodyPr/>
+                    <a:lstStyle/>
+                    <a:p>
+                      <a:pPr algn="ctr"/>
+                      <a:r>
                         <a:rPr lang="de-DE" sz="1600" dirty="0" err="1"/>
                         <a:t>Lorem</a:t>
                       </a:r>
@@ -14214,18 +14261,7 @@
                         <a:rPr lang="de-DE" sz="1600" dirty="0" err="1"/>
                         <a:t>consetetur</a:t>
                       </a:r>
-                      <a:r>
-                        <a:rPr lang="de-DE" sz="1600" dirty="0"/>
-                        <a:t> </a:t>
-                      </a:r>
-                      <a:r>
-                        <a:rPr lang="de-DE" sz="1600" dirty="0" err="1"/>
-                        <a:t>sadipscing</a:t>
-                      </a:r>
-                      <a:r>
-                        <a:rPr lang="de-DE" sz="1600" dirty="0"/>
-                        <a:t>...</a:t>
-                      </a:r>
+                      <a:endParaRPr lang="de-DE" sz="1600" dirty="0"/>
                     </a:p>
                   </a:txBody>
                   <a:tcPr/>
@@ -14260,6 +14296,20 @@
                       <a:r>
                         <a:rPr lang="de-DE" sz="1600" dirty="0"/>
                         <a:t>Coldplay</a:t>
+                      </a:r>
+                    </a:p>
+                  </a:txBody>
+                  <a:tcPr/>
+                </a:tc>
+                <a:tc>
+                  <a:txBody>
+                    <a:bodyPr/>
+                    <a:lstStyle/>
+                    <a:p>
+                      <a:pPr algn="ctr"/>
+                      <a:r>
+                        <a:rPr lang="de-DE" sz="1600" dirty="0"/>
+                        <a:t>-</a:t>
                       </a:r>
                     </a:p>
                   </a:txBody>
@@ -14331,18 +14381,7 @@
                         <a:rPr lang="de-DE" sz="1600" dirty="0" err="1"/>
                         <a:t>consetetur</a:t>
                       </a:r>
-                      <a:r>
-                        <a:rPr lang="de-DE" sz="1600" dirty="0"/>
-                        <a:t> </a:t>
-                      </a:r>
-                      <a:r>
-                        <a:rPr lang="de-DE" sz="1600" dirty="0" err="1"/>
-                        <a:t>sadipscing</a:t>
-                      </a:r>
-                      <a:r>
-                        <a:rPr lang="de-DE" sz="1600" dirty="0"/>
-                        <a:t>...</a:t>
-                      </a:r>
+                      <a:endParaRPr lang="de-DE" sz="1600" dirty="0"/>
                     </a:p>
                   </a:txBody>
                   <a:tcPr/>
@@ -14378,6 +14417,17 @@
                         <a:rPr lang="de-DE" sz="1600" dirty="0"/>
                         <a:t>Alex Gaskarth</a:t>
                       </a:r>
+                    </a:p>
+                  </a:txBody>
+                  <a:tcPr/>
+                </a:tc>
+                <a:tc>
+                  <a:txBody>
+                    <a:bodyPr/>
+                    <a:lstStyle/>
+                    <a:p>
+                      <a:pPr algn="ctr"/>
+                      <a:endParaRPr lang="de-DE" sz="1600" dirty="0"/>
                     </a:p>
                   </a:txBody>
                   <a:tcPr/>
@@ -14443,6 +14493,17 @@
                         <a:rPr lang="de-DE" sz="1600" dirty="0"/>
                         <a:t>Jack Barakat</a:t>
                       </a:r>
+                    </a:p>
+                  </a:txBody>
+                  <a:tcPr/>
+                </a:tc>
+                <a:tc>
+                  <a:txBody>
+                    <a:bodyPr/>
+                    <a:lstStyle/>
+                    <a:p>
+                      <a:pPr algn="ctr"/>
+                      <a:endParaRPr lang="de-DE" sz="1600" dirty="0"/>
                     </a:p>
                   </a:txBody>
                   <a:tcPr/>

</xml_diff>